<commit_message>
Dossier à rendre, à valider par l'équipe
</commit_message>
<xml_diff>
--- a/Projet_Rendu.pptx
+++ b/Projet_Rendu.pptx
@@ -5,23 +5,24 @@
     <p:sldMasterId id="2147483648" r:id="rId1"/>
   </p:sldMasterIdLst>
   <p:notesMasterIdLst>
-    <p:notesMasterId r:id="rId16"/>
+    <p:notesMasterId r:id="rId17"/>
   </p:notesMasterIdLst>
   <p:sldIdLst>
     <p:sldId id="270" r:id="rId2"/>
-    <p:sldId id="263" r:id="rId3"/>
-    <p:sldId id="256" r:id="rId4"/>
-    <p:sldId id="257" r:id="rId5"/>
-    <p:sldId id="258" r:id="rId6"/>
-    <p:sldId id="259" r:id="rId7"/>
-    <p:sldId id="260" r:id="rId8"/>
-    <p:sldId id="261" r:id="rId9"/>
-    <p:sldId id="262" r:id="rId10"/>
-    <p:sldId id="264" r:id="rId11"/>
-    <p:sldId id="266" r:id="rId12"/>
-    <p:sldId id="267" r:id="rId13"/>
-    <p:sldId id="268" r:id="rId14"/>
-    <p:sldId id="269" r:id="rId15"/>
+    <p:sldId id="271" r:id="rId3"/>
+    <p:sldId id="263" r:id="rId4"/>
+    <p:sldId id="256" r:id="rId5"/>
+    <p:sldId id="257" r:id="rId6"/>
+    <p:sldId id="258" r:id="rId7"/>
+    <p:sldId id="259" r:id="rId8"/>
+    <p:sldId id="260" r:id="rId9"/>
+    <p:sldId id="261" r:id="rId10"/>
+    <p:sldId id="262" r:id="rId11"/>
+    <p:sldId id="264" r:id="rId12"/>
+    <p:sldId id="266" r:id="rId13"/>
+    <p:sldId id="267" r:id="rId14"/>
+    <p:sldId id="268" r:id="rId15"/>
+    <p:sldId id="269" r:id="rId16"/>
   </p:sldIdLst>
   <p:sldSz cx="9144000" cy="6858000" type="screen4x3"/>
   <p:notesSz cx="6858000" cy="9144000"/>
@@ -542,7 +543,7 @@
           <a:p>
             <a:fld id="{CEFF10A2-4935-6942-8765-6FD66C09605C}" type="slidenum">
               <a:rPr lang="fr-FR" smtClean="0"/>
-              <a:t>2</a:t>
+              <a:t>3</a:t>
             </a:fld>
             <a:endParaRPr lang="fr-FR"/>
           </a:p>
@@ -630,7 +631,7 @@
           <a:p>
             <a:fld id="{CEFF10A2-4935-6942-8765-6FD66C09605C}" type="slidenum">
               <a:rPr lang="fr-FR" smtClean="0"/>
-              <a:t>4</a:t>
+              <a:t>5</a:t>
             </a:fld>
             <a:endParaRPr lang="fr-FR"/>
           </a:p>
@@ -718,7 +719,7 @@
           <a:p>
             <a:fld id="{CEFF10A2-4935-6942-8765-6FD66C09605C}" type="slidenum">
               <a:rPr lang="fr-FR" smtClean="0"/>
-              <a:t>5</a:t>
+              <a:t>6</a:t>
             </a:fld>
             <a:endParaRPr lang="fr-FR"/>
           </a:p>
@@ -806,7 +807,7 @@
           <a:p>
             <a:fld id="{CEFF10A2-4935-6942-8765-6FD66C09605C}" type="slidenum">
               <a:rPr lang="fr-FR" smtClean="0"/>
-              <a:t>6</a:t>
+              <a:t>7</a:t>
             </a:fld>
             <a:endParaRPr lang="fr-FR"/>
           </a:p>
@@ -894,7 +895,7 @@
           <a:p>
             <a:fld id="{CEFF10A2-4935-6942-8765-6FD66C09605C}" type="slidenum">
               <a:rPr lang="fr-FR" smtClean="0"/>
-              <a:t>7</a:t>
+              <a:t>8</a:t>
             </a:fld>
             <a:endParaRPr lang="fr-FR"/>
           </a:p>
@@ -982,7 +983,7 @@
           <a:p>
             <a:fld id="{CEFF10A2-4935-6942-8765-6FD66C09605C}" type="slidenum">
               <a:rPr lang="fr-FR" smtClean="0"/>
-              <a:t>8</a:t>
+              <a:t>9</a:t>
             </a:fld>
             <a:endParaRPr lang="fr-FR"/>
           </a:p>
@@ -1070,7 +1071,7 @@
           <a:p>
             <a:fld id="{CEFF10A2-4935-6942-8765-6FD66C09605C}" type="slidenum">
               <a:rPr lang="fr-FR" smtClean="0"/>
-              <a:t>9</a:t>
+              <a:t>10</a:t>
             </a:fld>
             <a:endParaRPr lang="fr-FR"/>
           </a:p>
@@ -4393,6 +4394,30 @@
           </a:p>
         </p:txBody>
       </p:sp>
+      <p:pic>
+        <p:nvPicPr>
+          <p:cNvPr id="6" name="Image 5"/>
+          <p:cNvPicPr>
+            <a:picLocks noChangeAspect="1"/>
+          </p:cNvPicPr>
+          <p:nvPr/>
+        </p:nvPicPr>
+        <p:blipFill>
+          <a:blip r:embed="rId2"/>
+          <a:stretch>
+            <a:fillRect/>
+          </a:stretch>
+        </p:blipFill>
+        <p:spPr>
+          <a:xfrm>
+            <a:off x="3128210" y="3280256"/>
+            <a:ext cx="3578865" cy="2548375"/>
+          </a:xfrm>
+          <a:prstGeom prst="rect">
+            <a:avLst/>
+          </a:prstGeom>
+        </p:spPr>
+      </p:pic>
     </p:spTree>
     <p:extLst>
       <p:ext uri="{BB962C8B-B14F-4D97-AF65-F5344CB8AC3E}">
@@ -4407,6 +4432,60 @@
 </file>
 
 <file path=ppt/slides/slide10.xml><?xml version="1.0" encoding="utf-8"?>
+<p:sld xmlns:a="http://schemas.openxmlformats.org/drawingml/2006/main" xmlns:r="http://schemas.openxmlformats.org/officeDocument/2006/relationships" xmlns:p="http://schemas.openxmlformats.org/presentationml/2006/main">
+  <p:cSld>
+    <p:spTree>
+      <p:nvGrpSpPr>
+        <p:cNvPr id="1" name=""/>
+        <p:cNvGrpSpPr/>
+        <p:nvPr/>
+      </p:nvGrpSpPr>
+      <p:grpSpPr>
+        <a:xfrm>
+          <a:off x="0" y="0"/>
+          <a:ext cx="0" cy="0"/>
+          <a:chOff x="0" y="0"/>
+          <a:chExt cx="0" cy="0"/>
+        </a:xfrm>
+      </p:grpSpPr>
+      <p:pic>
+        <p:nvPicPr>
+          <p:cNvPr id="5" name="Image 4"/>
+          <p:cNvPicPr>
+            <a:picLocks noChangeAspect="1"/>
+          </p:cNvPicPr>
+          <p:nvPr/>
+        </p:nvPicPr>
+        <p:blipFill>
+          <a:blip r:embed="rId3"/>
+          <a:stretch>
+            <a:fillRect/>
+          </a:stretch>
+        </p:blipFill>
+        <p:spPr>
+          <a:xfrm>
+            <a:off x="0" y="355600"/>
+            <a:ext cx="9144000" cy="6130636"/>
+          </a:xfrm>
+          <a:prstGeom prst="rect">
+            <a:avLst/>
+          </a:prstGeom>
+        </p:spPr>
+      </p:pic>
+    </p:spTree>
+    <p:extLst>
+      <p:ext uri="{BB962C8B-B14F-4D97-AF65-F5344CB8AC3E}">
+        <p14:creationId xmlns:p14="http://schemas.microsoft.com/office/powerpoint/2010/main" val="1350776491"/>
+      </p:ext>
+    </p:extLst>
+  </p:cSld>
+  <p:clrMapOvr>
+    <a:masterClrMapping/>
+  </p:clrMapOvr>
+</p:sld>
+</file>
+
+<file path=ppt/slides/slide11.xml><?xml version="1.0" encoding="utf-8"?>
 <p:sld xmlns:a="http://schemas.openxmlformats.org/drawingml/2006/main" xmlns:r="http://schemas.openxmlformats.org/officeDocument/2006/relationships" xmlns:p="http://schemas.openxmlformats.org/presentationml/2006/main">
   <p:cSld>
     <p:spTree>
@@ -4471,6 +4550,66 @@
           </a:prstGeom>
         </p:spPr>
       </p:pic>
+      <p:sp>
+        <p:nvSpPr>
+          <p:cNvPr id="6" name="ZoneTexte 5"/>
+          <p:cNvSpPr txBox="1"/>
+          <p:nvPr/>
+        </p:nvSpPr>
+        <p:spPr>
+          <a:xfrm>
+            <a:off x="748631" y="419405"/>
+            <a:ext cx="2299368" cy="369332"/>
+          </a:xfrm>
+          <a:prstGeom prst="rect">
+            <a:avLst/>
+          </a:prstGeom>
+          <a:noFill/>
+        </p:spPr>
+        <p:txBody>
+          <a:bodyPr wrap="square" rtlCol="0">
+            <a:spAutoFit/>
+          </a:bodyPr>
+          <a:lstStyle/>
+          <a:p>
+            <a:r>
+              <a:rPr lang="fr-FR" dirty="0" smtClean="0"/>
+              <a:t>Etat/Transition : Avis</a:t>
+            </a:r>
+            <a:endParaRPr lang="fr-FR" dirty="0"/>
+          </a:p>
+        </p:txBody>
+      </p:sp>
+      <p:sp>
+        <p:nvSpPr>
+          <p:cNvPr id="7" name="ZoneTexte 6"/>
+          <p:cNvSpPr txBox="1"/>
+          <p:nvPr/>
+        </p:nvSpPr>
+        <p:spPr>
+          <a:xfrm>
+            <a:off x="5178910" y="419405"/>
+            <a:ext cx="2299368" cy="369332"/>
+          </a:xfrm>
+          <a:prstGeom prst="rect">
+            <a:avLst/>
+          </a:prstGeom>
+          <a:noFill/>
+        </p:spPr>
+        <p:txBody>
+          <a:bodyPr wrap="square" rtlCol="0">
+            <a:spAutoFit/>
+          </a:bodyPr>
+          <a:lstStyle/>
+          <a:p>
+            <a:r>
+              <a:rPr lang="fr-FR" dirty="0" smtClean="0"/>
+              <a:t>Etat/Transition : Offre</a:t>
+            </a:r>
+            <a:endParaRPr lang="fr-FR" dirty="0"/>
+          </a:p>
+        </p:txBody>
+      </p:sp>
     </p:spTree>
     <p:extLst>
       <p:ext uri="{BB962C8B-B14F-4D97-AF65-F5344CB8AC3E}">
@@ -4484,7 +4623,7 @@
 </p:sld>
 </file>
 
-<file path=ppt/slides/slide11.xml><?xml version="1.0" encoding="utf-8"?>
+<file path=ppt/slides/slide12.xml><?xml version="1.0" encoding="utf-8"?>
 <p:sld xmlns:a="http://schemas.openxmlformats.org/drawingml/2006/main" xmlns:r="http://schemas.openxmlformats.org/officeDocument/2006/relationships" xmlns:p="http://schemas.openxmlformats.org/presentationml/2006/main">
   <p:cSld>
     <p:spTree>
@@ -4517,7 +4656,7 @@
         </p:blipFill>
         <p:spPr>
           <a:xfrm>
-            <a:off x="1905000" y="1778000"/>
+            <a:off x="2145631" y="1323468"/>
             <a:ext cx="5334000" cy="3302000"/>
           </a:xfrm>
           <a:prstGeom prst="rect">
@@ -4525,6 +4664,36 @@
           </a:prstGeom>
         </p:spPr>
       </p:pic>
+      <p:sp>
+        <p:nvSpPr>
+          <p:cNvPr id="5" name="ZoneTexte 4"/>
+          <p:cNvSpPr txBox="1"/>
+          <p:nvPr/>
+        </p:nvSpPr>
+        <p:spPr>
+          <a:xfrm>
+            <a:off x="748631" y="673397"/>
+            <a:ext cx="3462422" cy="369332"/>
+          </a:xfrm>
+          <a:prstGeom prst="rect">
+            <a:avLst/>
+          </a:prstGeom>
+          <a:noFill/>
+        </p:spPr>
+        <p:txBody>
+          <a:bodyPr wrap="square" rtlCol="0">
+            <a:spAutoFit/>
+          </a:bodyPr>
+          <a:lstStyle/>
+          <a:p>
+            <a:r>
+              <a:rPr lang="fr-FR" dirty="0" smtClean="0"/>
+              <a:t>Etat/Transition : Réservation</a:t>
+            </a:r>
+            <a:endParaRPr lang="fr-FR" dirty="0"/>
+          </a:p>
+        </p:txBody>
+      </p:sp>
     </p:spTree>
     <p:extLst>
       <p:ext uri="{BB962C8B-B14F-4D97-AF65-F5344CB8AC3E}">
@@ -4538,7 +4707,7 @@
 </p:sld>
 </file>
 
-<file path=ppt/slides/slide12.xml><?xml version="1.0" encoding="utf-8"?>
+<file path=ppt/slides/slide13.xml><?xml version="1.0" encoding="utf-8"?>
 <p:sld xmlns:a="http://schemas.openxmlformats.org/drawingml/2006/main" xmlns:r="http://schemas.openxmlformats.org/officeDocument/2006/relationships" xmlns:p="http://schemas.openxmlformats.org/presentationml/2006/main">
   <p:cSld>
     <p:spTree>
@@ -4592,7 +4761,7 @@
 </p:sld>
 </file>
 
-<file path=ppt/slides/slide13.xml><?xml version="1.0" encoding="utf-8"?>
+<file path=ppt/slides/slide14.xml><?xml version="1.0" encoding="utf-8"?>
 <p:sld xmlns:a="http://schemas.openxmlformats.org/drawingml/2006/main" xmlns:r="http://schemas.openxmlformats.org/officeDocument/2006/relationships" xmlns:p="http://schemas.openxmlformats.org/presentationml/2006/main">
   <p:cSld>
     <p:spTree>
@@ -4646,7 +4815,7 @@
 </p:sld>
 </file>
 
-<file path=ppt/slides/slide14.xml><?xml version="1.0" encoding="utf-8"?>
+<file path=ppt/slides/slide15.xml><?xml version="1.0" encoding="utf-8"?>
 <p:sld xmlns:a="http://schemas.openxmlformats.org/drawingml/2006/main" xmlns:r="http://schemas.openxmlformats.org/officeDocument/2006/relationships" xmlns:p="http://schemas.openxmlformats.org/presentationml/2006/main">
   <p:cSld>
     <p:spTree>
@@ -4824,6 +4993,296 @@
 </file>
 
 <file path=ppt/slides/slide2.xml><?xml version="1.0" encoding="utf-8"?>
+<p:sld xmlns:a="http://schemas.openxmlformats.org/drawingml/2006/main" xmlns:r="http://schemas.openxmlformats.org/officeDocument/2006/relationships" xmlns:p="http://schemas.openxmlformats.org/presentationml/2006/main">
+  <p:cSld>
+    <p:spTree>
+      <p:nvGrpSpPr>
+        <p:cNvPr id="1" name=""/>
+        <p:cNvGrpSpPr/>
+        <p:nvPr/>
+      </p:nvGrpSpPr>
+      <p:grpSpPr>
+        <a:xfrm>
+          <a:off x="0" y="0"/>
+          <a:ext cx="0" cy="0"/>
+          <a:chOff x="0" y="0"/>
+          <a:chExt cx="0" cy="0"/>
+        </a:xfrm>
+      </p:grpSpPr>
+      <p:pic>
+        <p:nvPicPr>
+          <p:cNvPr id="4" name="Image 3"/>
+          <p:cNvPicPr>
+            <a:picLocks noChangeAspect="1"/>
+          </p:cNvPicPr>
+          <p:nvPr/>
+        </p:nvPicPr>
+        <p:blipFill>
+          <a:blip r:embed="rId2"/>
+          <a:stretch>
+            <a:fillRect/>
+          </a:stretch>
+        </p:blipFill>
+        <p:spPr>
+          <a:xfrm>
+            <a:off x="0" y="788712"/>
+            <a:ext cx="4585368" cy="2039814"/>
+          </a:xfrm>
+          <a:prstGeom prst="rect">
+            <a:avLst/>
+          </a:prstGeom>
+        </p:spPr>
+      </p:pic>
+      <p:pic>
+        <p:nvPicPr>
+          <p:cNvPr id="5" name="Image 4"/>
+          <p:cNvPicPr>
+            <a:picLocks noChangeAspect="1"/>
+          </p:cNvPicPr>
+          <p:nvPr/>
+        </p:nvPicPr>
+        <p:blipFill>
+          <a:blip r:embed="rId3"/>
+          <a:stretch>
+            <a:fillRect/>
+          </a:stretch>
+        </p:blipFill>
+        <p:spPr>
+          <a:xfrm>
+            <a:off x="4585368" y="783198"/>
+            <a:ext cx="4585368" cy="2031960"/>
+          </a:xfrm>
+          <a:prstGeom prst="rect">
+            <a:avLst/>
+          </a:prstGeom>
+        </p:spPr>
+      </p:pic>
+      <p:pic>
+        <p:nvPicPr>
+          <p:cNvPr id="6" name="Image 5"/>
+          <p:cNvPicPr>
+            <a:picLocks noChangeAspect="1"/>
+          </p:cNvPicPr>
+          <p:nvPr/>
+        </p:nvPicPr>
+        <p:blipFill>
+          <a:blip r:embed="rId4"/>
+          <a:stretch>
+            <a:fillRect/>
+          </a:stretch>
+        </p:blipFill>
+        <p:spPr>
+          <a:xfrm>
+            <a:off x="5799" y="2815158"/>
+            <a:ext cx="4592937" cy="2038684"/>
+          </a:xfrm>
+          <a:prstGeom prst="rect">
+            <a:avLst/>
+          </a:prstGeom>
+        </p:spPr>
+      </p:pic>
+      <p:pic>
+        <p:nvPicPr>
+          <p:cNvPr id="8" name="Image 7"/>
+          <p:cNvPicPr>
+            <a:picLocks noChangeAspect="1"/>
+          </p:cNvPicPr>
+          <p:nvPr/>
+        </p:nvPicPr>
+        <p:blipFill>
+          <a:blip r:embed="rId5"/>
+          <a:stretch>
+            <a:fillRect/>
+          </a:stretch>
+        </p:blipFill>
+        <p:spPr>
+          <a:xfrm>
+            <a:off x="4603715" y="2815158"/>
+            <a:ext cx="4567021" cy="2025316"/>
+          </a:xfrm>
+          <a:prstGeom prst="rect">
+            <a:avLst/>
+          </a:prstGeom>
+        </p:spPr>
+      </p:pic>
+      <p:pic>
+        <p:nvPicPr>
+          <p:cNvPr id="9" name="Image 8"/>
+          <p:cNvPicPr>
+            <a:picLocks noChangeAspect="1"/>
+          </p:cNvPicPr>
+          <p:nvPr/>
+        </p:nvPicPr>
+        <p:blipFill>
+          <a:blip r:embed="rId6"/>
+          <a:stretch>
+            <a:fillRect/>
+          </a:stretch>
+        </p:blipFill>
+        <p:spPr>
+          <a:xfrm>
+            <a:off x="5799" y="4853842"/>
+            <a:ext cx="4602361" cy="2025984"/>
+          </a:xfrm>
+          <a:prstGeom prst="rect">
+            <a:avLst/>
+          </a:prstGeom>
+        </p:spPr>
+      </p:pic>
+      <p:pic>
+        <p:nvPicPr>
+          <p:cNvPr id="10" name="Image 9"/>
+          <p:cNvPicPr>
+            <a:picLocks noChangeAspect="1"/>
+          </p:cNvPicPr>
+          <p:nvPr/>
+        </p:nvPicPr>
+        <p:blipFill>
+          <a:blip r:embed="rId7"/>
+          <a:stretch>
+            <a:fillRect/>
+          </a:stretch>
+        </p:blipFill>
+        <p:spPr>
+          <a:xfrm>
+            <a:off x="4598736" y="4837773"/>
+            <a:ext cx="4585368" cy="2042053"/>
+          </a:xfrm>
+          <a:prstGeom prst="rect">
+            <a:avLst/>
+          </a:prstGeom>
+        </p:spPr>
+      </p:pic>
+      <p:pic>
+        <p:nvPicPr>
+          <p:cNvPr id="11" name="Image 10"/>
+          <p:cNvPicPr>
+            <a:picLocks noChangeAspect="1"/>
+          </p:cNvPicPr>
+          <p:nvPr/>
+        </p:nvPicPr>
+        <p:blipFill>
+          <a:blip r:embed="rId8"/>
+          <a:stretch>
+            <a:fillRect/>
+          </a:stretch>
+        </p:blipFill>
+        <p:spPr>
+          <a:xfrm>
+            <a:off x="0" y="0"/>
+            <a:ext cx="9144000" cy="598394"/>
+          </a:xfrm>
+          <a:prstGeom prst="rect">
+            <a:avLst/>
+          </a:prstGeom>
+        </p:spPr>
+      </p:pic>
+      <p:sp>
+        <p:nvSpPr>
+          <p:cNvPr id="12" name="Rectangle 11"/>
+          <p:cNvSpPr/>
+          <p:nvPr/>
+        </p:nvSpPr>
+        <p:spPr>
+          <a:xfrm>
+            <a:off x="106947" y="651866"/>
+            <a:ext cx="8916737" cy="45719"/>
+          </a:xfrm>
+          <a:prstGeom prst="rect">
+            <a:avLst/>
+          </a:prstGeom>
+          <a:solidFill>
+            <a:schemeClr val="tx1"/>
+          </a:solidFill>
+          <a:ln>
+            <a:solidFill>
+              <a:schemeClr val="tx1"/>
+            </a:solidFill>
+          </a:ln>
+        </p:spPr>
+        <p:style>
+          <a:lnRef idx="1">
+            <a:schemeClr val="accent1"/>
+          </a:lnRef>
+          <a:fillRef idx="3">
+            <a:schemeClr val="accent1"/>
+          </a:fillRef>
+          <a:effectRef idx="2">
+            <a:schemeClr val="accent1"/>
+          </a:effectRef>
+          <a:fontRef idx="minor">
+            <a:schemeClr val="lt1"/>
+          </a:fontRef>
+        </p:style>
+        <p:txBody>
+          <a:bodyPr rtlCol="0" anchor="ctr"/>
+          <a:lstStyle/>
+          <a:p>
+            <a:pPr algn="ctr"/>
+            <a:endParaRPr lang="fr-FR"/>
+          </a:p>
+        </p:txBody>
+      </p:sp>
+      <p:sp>
+        <p:nvSpPr>
+          <p:cNvPr id="13" name="ZoneTexte 12"/>
+          <p:cNvSpPr txBox="1"/>
+          <p:nvPr/>
+        </p:nvSpPr>
+        <p:spPr>
+          <a:xfrm>
+            <a:off x="106947" y="6435195"/>
+            <a:ext cx="4478421" cy="369332"/>
+          </a:xfrm>
+          <a:prstGeom prst="rect">
+            <a:avLst/>
+          </a:prstGeom>
+          <a:noFill/>
+        </p:spPr>
+        <p:txBody>
+          <a:bodyPr wrap="square" rtlCol="0">
+            <a:spAutoFit/>
+          </a:bodyPr>
+          <a:lstStyle/>
+          <a:p>
+            <a:r>
+              <a:rPr lang="fr-FR" u="sng" dirty="0" smtClean="0">
+                <a:solidFill>
+                  <a:schemeClr val="bg1"/>
+                </a:solidFill>
+              </a:rPr>
+              <a:t>Imprimes écran de notre activité sur </a:t>
+            </a:r>
+            <a:r>
+              <a:rPr lang="fr-FR" u="sng" dirty="0" err="1" smtClean="0">
+                <a:solidFill>
+                  <a:schemeClr val="bg1"/>
+                </a:solidFill>
+              </a:rPr>
+              <a:t>Trello</a:t>
+            </a:r>
+            <a:endParaRPr lang="fr-FR" u="sng" dirty="0">
+              <a:solidFill>
+                <a:schemeClr val="bg1"/>
+              </a:solidFill>
+            </a:endParaRPr>
+          </a:p>
+        </p:txBody>
+      </p:sp>
+    </p:spTree>
+    <p:extLst>
+      <p:ext uri="{BB962C8B-B14F-4D97-AF65-F5344CB8AC3E}">
+        <p14:creationId xmlns:p14="http://schemas.microsoft.com/office/powerpoint/2010/main" val="2863794209"/>
+      </p:ext>
+    </p:extLst>
+  </p:cSld>
+  <p:clrMapOvr>
+    <a:masterClrMapping/>
+  </p:clrMapOvr>
+</p:sld>
+</file>
+
+<file path=ppt/slides/slide3.xml><?xml version="1.0" encoding="utf-8"?>
 <p:sld xmlns:a="http://schemas.openxmlformats.org/drawingml/2006/main" xmlns:r="http://schemas.openxmlformats.org/officeDocument/2006/relationships" xmlns:p="http://schemas.openxmlformats.org/presentationml/2006/main">
   <p:cSld>
     <p:spTree>
@@ -4864,6 +5323,36 @@
           </a:prstGeom>
         </p:spPr>
       </p:pic>
+      <p:sp>
+        <p:nvSpPr>
+          <p:cNvPr id="5" name="ZoneTexte 4"/>
+          <p:cNvSpPr txBox="1"/>
+          <p:nvPr/>
+        </p:nvSpPr>
+        <p:spPr>
+          <a:xfrm>
+            <a:off x="3930316" y="6453201"/>
+            <a:ext cx="2299368" cy="369332"/>
+          </a:xfrm>
+          <a:prstGeom prst="rect">
+            <a:avLst/>
+          </a:prstGeom>
+          <a:noFill/>
+        </p:spPr>
+        <p:txBody>
+          <a:bodyPr wrap="square" rtlCol="0">
+            <a:spAutoFit/>
+          </a:bodyPr>
+          <a:lstStyle/>
+          <a:p>
+            <a:r>
+              <a:rPr lang="fr-FR" dirty="0" smtClean="0"/>
+              <a:t>Cas d’utilisation</a:t>
+            </a:r>
+            <a:endParaRPr lang="fr-FR" dirty="0"/>
+          </a:p>
+        </p:txBody>
+      </p:sp>
     </p:spTree>
     <p:extLst>
       <p:ext uri="{BB962C8B-B14F-4D97-AF65-F5344CB8AC3E}">
@@ -4877,7 +5366,7 @@
 </p:sld>
 </file>
 
-<file path=ppt/slides/slide3.xml><?xml version="1.0" encoding="utf-8"?>
+<file path=ppt/slides/slide4.xml><?xml version="1.0" encoding="utf-8"?>
 <p:sld xmlns:a="http://schemas.openxmlformats.org/drawingml/2006/main" xmlns:r="http://schemas.openxmlformats.org/officeDocument/2006/relationships" xmlns:p="http://schemas.openxmlformats.org/presentationml/2006/main">
   <p:cSld>
     <p:spTree>
@@ -4957,6 +5446,36 @@
           </a:p>
         </p:txBody>
       </p:sp>
+      <p:sp>
+        <p:nvSpPr>
+          <p:cNvPr id="7" name="ZoneTexte 6"/>
+          <p:cNvSpPr txBox="1"/>
+          <p:nvPr/>
+        </p:nvSpPr>
+        <p:spPr>
+          <a:xfrm>
+            <a:off x="949158" y="6453201"/>
+            <a:ext cx="2299368" cy="369332"/>
+          </a:xfrm>
+          <a:prstGeom prst="rect">
+            <a:avLst/>
+          </a:prstGeom>
+          <a:noFill/>
+        </p:spPr>
+        <p:txBody>
+          <a:bodyPr wrap="square" rtlCol="0">
+            <a:spAutoFit/>
+          </a:bodyPr>
+          <a:lstStyle/>
+          <a:p>
+            <a:r>
+              <a:rPr lang="fr-FR" dirty="0" smtClean="0"/>
+              <a:t>Diagramme de classe</a:t>
+            </a:r>
+            <a:endParaRPr lang="fr-FR" dirty="0"/>
+          </a:p>
+        </p:txBody>
+      </p:sp>
     </p:spTree>
     <p:extLst>
       <p:ext uri="{BB962C8B-B14F-4D97-AF65-F5344CB8AC3E}">
@@ -4970,7 +5489,7 @@
 </p:sld>
 </file>
 
-<file path=ppt/slides/slide4.xml><?xml version="1.0" encoding="utf-8"?>
+<file path=ppt/slides/slide5.xml><?xml version="1.0" encoding="utf-8"?>
 <p:sld xmlns:a="http://schemas.openxmlformats.org/drawingml/2006/main" xmlns:r="http://schemas.openxmlformats.org/officeDocument/2006/relationships" xmlns:p="http://schemas.openxmlformats.org/presentationml/2006/main">
   <p:cSld>
     <p:spTree>
@@ -5024,7 +5543,7 @@
 </p:sld>
 </file>
 
-<file path=ppt/slides/slide5.xml><?xml version="1.0" encoding="utf-8"?>
+<file path=ppt/slides/slide6.xml><?xml version="1.0" encoding="utf-8"?>
 <p:sld xmlns:a="http://schemas.openxmlformats.org/drawingml/2006/main" xmlns:r="http://schemas.openxmlformats.org/officeDocument/2006/relationships" xmlns:p="http://schemas.openxmlformats.org/presentationml/2006/main">
   <p:cSld>
     <p:spTree>
@@ -5078,7 +5597,7 @@
 </p:sld>
 </file>
 
-<file path=ppt/slides/slide6.xml><?xml version="1.0" encoding="utf-8"?>
+<file path=ppt/slides/slide7.xml><?xml version="1.0" encoding="utf-8"?>
 <p:sld xmlns:a="http://schemas.openxmlformats.org/drawingml/2006/main" xmlns:r="http://schemas.openxmlformats.org/officeDocument/2006/relationships" xmlns:p="http://schemas.openxmlformats.org/presentationml/2006/main">
   <p:cSld>
     <p:spTree>
@@ -5132,7 +5651,7 @@
 </p:sld>
 </file>
 
-<file path=ppt/slides/slide7.xml><?xml version="1.0" encoding="utf-8"?>
+<file path=ppt/slides/slide8.xml><?xml version="1.0" encoding="utf-8"?>
 <p:sld xmlns:a="http://schemas.openxmlformats.org/drawingml/2006/main" xmlns:r="http://schemas.openxmlformats.org/officeDocument/2006/relationships" xmlns:p="http://schemas.openxmlformats.org/presentationml/2006/main">
   <p:cSld>
     <p:spTree>
@@ -5186,7 +5705,7 @@
 </p:sld>
 </file>
 
-<file path=ppt/slides/slide8.xml><?xml version="1.0" encoding="utf-8"?>
+<file path=ppt/slides/slide9.xml><?xml version="1.0" encoding="utf-8"?>
 <p:sld xmlns:a="http://schemas.openxmlformats.org/drawingml/2006/main" xmlns:r="http://schemas.openxmlformats.org/officeDocument/2006/relationships" xmlns:p="http://schemas.openxmlformats.org/presentationml/2006/main">
   <p:cSld>
     <p:spTree>
@@ -5231,60 +5750,6 @@
     <p:extLst>
       <p:ext uri="{BB962C8B-B14F-4D97-AF65-F5344CB8AC3E}">
         <p14:creationId xmlns:p14="http://schemas.microsoft.com/office/powerpoint/2010/main" val="1867404109"/>
-      </p:ext>
-    </p:extLst>
-  </p:cSld>
-  <p:clrMapOvr>
-    <a:masterClrMapping/>
-  </p:clrMapOvr>
-</p:sld>
-</file>
-
-<file path=ppt/slides/slide9.xml><?xml version="1.0" encoding="utf-8"?>
-<p:sld xmlns:a="http://schemas.openxmlformats.org/drawingml/2006/main" xmlns:r="http://schemas.openxmlformats.org/officeDocument/2006/relationships" xmlns:p="http://schemas.openxmlformats.org/presentationml/2006/main">
-  <p:cSld>
-    <p:spTree>
-      <p:nvGrpSpPr>
-        <p:cNvPr id="1" name=""/>
-        <p:cNvGrpSpPr/>
-        <p:nvPr/>
-      </p:nvGrpSpPr>
-      <p:grpSpPr>
-        <a:xfrm>
-          <a:off x="0" y="0"/>
-          <a:ext cx="0" cy="0"/>
-          <a:chOff x="0" y="0"/>
-          <a:chExt cx="0" cy="0"/>
-        </a:xfrm>
-      </p:grpSpPr>
-      <p:pic>
-        <p:nvPicPr>
-          <p:cNvPr id="5" name="Image 4"/>
-          <p:cNvPicPr>
-            <a:picLocks noChangeAspect="1"/>
-          </p:cNvPicPr>
-          <p:nvPr/>
-        </p:nvPicPr>
-        <p:blipFill>
-          <a:blip r:embed="rId3"/>
-          <a:stretch>
-            <a:fillRect/>
-          </a:stretch>
-        </p:blipFill>
-        <p:spPr>
-          <a:xfrm>
-            <a:off x="0" y="355600"/>
-            <a:ext cx="9144000" cy="6130636"/>
-          </a:xfrm>
-          <a:prstGeom prst="rect">
-            <a:avLst/>
-          </a:prstGeom>
-        </p:spPr>
-      </p:pic>
-    </p:spTree>
-    <p:extLst>
-      <p:ext uri="{BB962C8B-B14F-4D97-AF65-F5344CB8AC3E}">
-        <p14:creationId xmlns:p14="http://schemas.microsoft.com/office/powerpoint/2010/main" val="1350776491"/>
       </p:ext>
     </p:extLst>
   </p:cSld>

</xml_diff>